<commit_message>
remove heavy folder (TDBRAIN_dataset)
</commit_message>
<xml_diff>
--- a/reunions/XAIGUIFORMER_reu1.pptx
+++ b/reunions/XAIGUIFORMER_reu1.pptx
@@ -5603,7 +5603,7 @@
         <p:spPr>
           <a:xfrm>
             <a:off x="6820592" y="3065298"/>
-            <a:ext cx="4643698" cy="1477328"/>
+            <a:ext cx="4643698" cy="1754326"/>
           </a:xfrm>
           <a:prstGeom prst="rect">
             <a:avLst/>
@@ -5690,7 +5690,25 @@
               <a:rPr lang="fr-FR" dirty="0">
                 <a:sym typeface="Wingdings" pitchFamily="2" charset="2"/>
               </a:rPr>
-              <a:t>Déposé sur git mais pas encore utilisé</a:t>
+              <a:t>Trop gros  </a:t>
+            </a:r>
+            <a:r>
+              <a:rPr lang="fr-FR" dirty="0" err="1">
+                <a:sym typeface="Wingdings" pitchFamily="2" charset="2"/>
+              </a:rPr>
+              <a:t>whatsapp</a:t>
+            </a:r>
+            <a:r>
+              <a:rPr lang="fr-FR">
+                <a:sym typeface="Wingdings" pitchFamily="2" charset="2"/>
+              </a:rPr>
+              <a:t> mais </a:t>
+            </a:r>
+            <a:r>
+              <a:rPr lang="fr-FR" dirty="0">
+                <a:sym typeface="Wingdings" pitchFamily="2" charset="2"/>
+              </a:rPr>
+              <a:t>pas encore utilisé</a:t>
             </a:r>
             <a:endParaRPr lang="fr-FR" dirty="0"/>
           </a:p>

</xml_diff>